<commit_message>
updated the Powerpoint files
</commit_message>
<xml_diff>
--- a/MSConvert_GUI_guide.pptx
+++ b/MSConvert_GUI_guide.pptx
@@ -124,6 +124,11 @@
       </a:defRPr>
     </a:lvl9pPr>
   </p:defaultTextStyle>
+  <p:extLst>
+    <p:ext uri="{EFAFB233-063F-42B5-8137-9DF3F51BA10A}">
+      <p15:sldGuideLst xmlns:p15="http://schemas.microsoft.com/office/powerpoint/2012/main"/>
+    </p:ext>
+  </p:extLst>
 </p:presentation>
 </file>
 
@@ -209,7 +214,7 @@
           <a:p>
             <a:fld id="{D1A7FC09-CA77-D943-826A-E2D1EFB4E7CC}" type="datetimeFigureOut">
               <a:rPr lang="en-US" smtClean="0"/>
-              <a:t>1/14/19</a:t>
+              <a:t>1/15/19</a:t>
             </a:fld>
             <a:endParaRPr lang="en-US"/>
           </a:p>
@@ -2319,7 +2324,7 @@
           <a:p>
             <a:fld id="{EE853BDC-D0CD-C14C-81D9-7C53D2446447}" type="datetimeFigureOut">
               <a:rPr lang="en-US" smtClean="0"/>
-              <a:t>1/14/19</a:t>
+              <a:t>1/15/19</a:t>
             </a:fld>
             <a:endParaRPr lang="en-US"/>
           </a:p>
@@ -2517,7 +2522,7 @@
           <a:p>
             <a:fld id="{EE853BDC-D0CD-C14C-81D9-7C53D2446447}" type="datetimeFigureOut">
               <a:rPr lang="en-US" smtClean="0"/>
-              <a:t>1/14/19</a:t>
+              <a:t>1/15/19</a:t>
             </a:fld>
             <a:endParaRPr lang="en-US"/>
           </a:p>
@@ -2725,7 +2730,7 @@
           <a:p>
             <a:fld id="{EE853BDC-D0CD-C14C-81D9-7C53D2446447}" type="datetimeFigureOut">
               <a:rPr lang="en-US" smtClean="0"/>
-              <a:t>1/14/19</a:t>
+              <a:t>1/15/19</a:t>
             </a:fld>
             <a:endParaRPr lang="en-US"/>
           </a:p>
@@ -2923,7 +2928,7 @@
           <a:p>
             <a:fld id="{EE853BDC-D0CD-C14C-81D9-7C53D2446447}" type="datetimeFigureOut">
               <a:rPr lang="en-US" smtClean="0"/>
-              <a:t>1/14/19</a:t>
+              <a:t>1/15/19</a:t>
             </a:fld>
             <a:endParaRPr lang="en-US"/>
           </a:p>
@@ -3198,7 +3203,7 @@
           <a:p>
             <a:fld id="{EE853BDC-D0CD-C14C-81D9-7C53D2446447}" type="datetimeFigureOut">
               <a:rPr lang="en-US" smtClean="0"/>
-              <a:t>1/14/19</a:t>
+              <a:t>1/15/19</a:t>
             </a:fld>
             <a:endParaRPr lang="en-US"/>
           </a:p>
@@ -3463,7 +3468,7 @@
           <a:p>
             <a:fld id="{EE853BDC-D0CD-C14C-81D9-7C53D2446447}" type="datetimeFigureOut">
               <a:rPr lang="en-US" smtClean="0"/>
-              <a:t>1/14/19</a:t>
+              <a:t>1/15/19</a:t>
             </a:fld>
             <a:endParaRPr lang="en-US"/>
           </a:p>
@@ -3875,7 +3880,7 @@
           <a:p>
             <a:fld id="{EE853BDC-D0CD-C14C-81D9-7C53D2446447}" type="datetimeFigureOut">
               <a:rPr lang="en-US" smtClean="0"/>
-              <a:t>1/14/19</a:t>
+              <a:t>1/15/19</a:t>
             </a:fld>
             <a:endParaRPr lang="en-US"/>
           </a:p>
@@ -4016,7 +4021,7 @@
           <a:p>
             <a:fld id="{EE853BDC-D0CD-C14C-81D9-7C53D2446447}" type="datetimeFigureOut">
               <a:rPr lang="en-US" smtClean="0"/>
-              <a:t>1/14/19</a:t>
+              <a:t>1/15/19</a:t>
             </a:fld>
             <a:endParaRPr lang="en-US"/>
           </a:p>
@@ -4129,7 +4134,7 @@
           <a:p>
             <a:fld id="{EE853BDC-D0CD-C14C-81D9-7C53D2446447}" type="datetimeFigureOut">
               <a:rPr lang="en-US" smtClean="0"/>
-              <a:t>1/14/19</a:t>
+              <a:t>1/15/19</a:t>
             </a:fld>
             <a:endParaRPr lang="en-US"/>
           </a:p>
@@ -4440,7 +4445,7 @@
           <a:p>
             <a:fld id="{EE853BDC-D0CD-C14C-81D9-7C53D2446447}" type="datetimeFigureOut">
               <a:rPr lang="en-US" smtClean="0"/>
-              <a:t>1/14/19</a:t>
+              <a:t>1/15/19</a:t>
             </a:fld>
             <a:endParaRPr lang="en-US"/>
           </a:p>
@@ -4728,7 +4733,7 @@
           <a:p>
             <a:fld id="{EE853BDC-D0CD-C14C-81D9-7C53D2446447}" type="datetimeFigureOut">
               <a:rPr lang="en-US" smtClean="0"/>
-              <a:t>1/14/19</a:t>
+              <a:t>1/15/19</a:t>
             </a:fld>
             <a:endParaRPr lang="en-US"/>
           </a:p>
@@ -4969,7 +4974,7 @@
           <a:p>
             <a:fld id="{EE853BDC-D0CD-C14C-81D9-7C53D2446447}" type="datetimeFigureOut">
               <a:rPr lang="en-US" smtClean="0"/>
-              <a:t>1/14/19</a:t>
+              <a:t>1/15/19</a:t>
             </a:fld>
             <a:endParaRPr lang="en-US"/>
           </a:p>
@@ -5726,7 +5731,7 @@
                   <a:srgbClr val="FF0000"/>
                 </a:solidFill>
               </a:rPr>
-              <a:t>of the</a:t>
+              <a:t>of the 24</a:t>
             </a:r>
             <a:br>
               <a:rPr lang="en-US" b="1" dirty="0">
@@ -5910,6 +5915,48 @@
           </a:p>
         </p:txBody>
       </p:sp>
+      <p:cxnSp>
+        <p:nvCxnSpPr>
+          <p:cNvPr id="8" name="Straight Arrow Connector 7">
+            <a:extLst>
+              <a:ext uri="{FF2B5EF4-FFF2-40B4-BE49-F238E27FC236}">
+                <a16:creationId xmlns:a16="http://schemas.microsoft.com/office/drawing/2014/main" id="{5CAFE15A-06DE-B24D-A4AF-8786D52D8679}"/>
+              </a:ext>
+            </a:extLst>
+          </p:cNvPr>
+          <p:cNvCxnSpPr/>
+          <p:nvPr/>
+        </p:nvCxnSpPr>
+        <p:spPr>
+          <a:xfrm flipV="1">
+            <a:off x="6769634" y="3772861"/>
+            <a:ext cx="0" cy="338097"/>
+          </a:xfrm>
+          <a:prstGeom prst="straightConnector1">
+            <a:avLst/>
+          </a:prstGeom>
+          <a:ln w="57150">
+            <a:solidFill>
+              <a:srgbClr val="FF0000"/>
+            </a:solidFill>
+            <a:tailEnd type="triangle"/>
+          </a:ln>
+        </p:spPr>
+        <p:style>
+          <a:lnRef idx="1">
+            <a:schemeClr val="accent1"/>
+          </a:lnRef>
+          <a:fillRef idx="0">
+            <a:schemeClr val="accent1"/>
+          </a:fillRef>
+          <a:effectRef idx="0">
+            <a:schemeClr val="accent1"/>
+          </a:effectRef>
+          <a:fontRef idx="minor">
+            <a:schemeClr val="tx1"/>
+          </a:fontRef>
+        </p:style>
+      </p:cxnSp>
     </p:spTree>
     <p:extLst>
       <p:ext uri="{BB962C8B-B14F-4D97-AF65-F5344CB8AC3E}">
@@ -5970,6 +6017,200 @@
           </a:prstGeom>
         </p:spPr>
       </p:pic>
+      <p:sp>
+        <p:nvSpPr>
+          <p:cNvPr id="2" name="TextBox 1">
+            <a:extLst>
+              <a:ext uri="{FF2B5EF4-FFF2-40B4-BE49-F238E27FC236}">
+                <a16:creationId xmlns:a16="http://schemas.microsoft.com/office/drawing/2014/main" id="{FBE41FD9-D5E8-8847-AD44-3819575EBA3A}"/>
+              </a:ext>
+            </a:extLst>
+          </p:cNvPr>
+          <p:cNvSpPr txBox="1"/>
+          <p:nvPr/>
+        </p:nvSpPr>
+        <p:spPr>
+          <a:xfrm>
+            <a:off x="4326113" y="2767301"/>
+            <a:ext cx="2312813" cy="646331"/>
+          </a:xfrm>
+          <a:prstGeom prst="rect">
+            <a:avLst/>
+          </a:prstGeom>
+          <a:noFill/>
+        </p:spPr>
+        <p:txBody>
+          <a:bodyPr wrap="none" rtlCol="0">
+            <a:spAutoFit/>
+          </a:bodyPr>
+          <a:lstStyle/>
+          <a:p>
+            <a:r>
+              <a:rPr lang="en-US" b="1" dirty="0">
+                <a:solidFill>
+                  <a:srgbClr val="FF0000"/>
+                </a:solidFill>
+              </a:rPr>
+              <a:t>Different numbers of </a:t>
+            </a:r>
+            <a:br>
+              <a:rPr lang="en-US" b="1" dirty="0">
+                <a:solidFill>
+                  <a:srgbClr val="FF0000"/>
+                </a:solidFill>
+              </a:rPr>
+            </a:br>
+            <a:r>
+              <a:rPr lang="en-US" b="1" dirty="0">
+                <a:solidFill>
+                  <a:srgbClr val="FF0000"/>
+                </a:solidFill>
+              </a:rPr>
+              <a:t>decimal places is good</a:t>
+            </a:r>
+          </a:p>
+        </p:txBody>
+      </p:sp>
+      <p:sp>
+        <p:nvSpPr>
+          <p:cNvPr id="4" name="TextBox 3">
+            <a:extLst>
+              <a:ext uri="{FF2B5EF4-FFF2-40B4-BE49-F238E27FC236}">
+                <a16:creationId xmlns:a16="http://schemas.microsoft.com/office/drawing/2014/main" id="{6EFA3F55-6B8D-5D47-9042-5C9E1A6DAF6A}"/>
+              </a:ext>
+            </a:extLst>
+          </p:cNvPr>
+          <p:cNvSpPr txBox="1"/>
+          <p:nvPr/>
+        </p:nvSpPr>
+        <p:spPr>
+          <a:xfrm>
+            <a:off x="4187798" y="5109882"/>
+            <a:ext cx="2167516" cy="646331"/>
+          </a:xfrm>
+          <a:prstGeom prst="rect">
+            <a:avLst/>
+          </a:prstGeom>
+          <a:noFill/>
+        </p:spPr>
+        <p:txBody>
+          <a:bodyPr wrap="none" rtlCol="0">
+            <a:spAutoFit/>
+          </a:bodyPr>
+          <a:lstStyle/>
+          <a:p>
+            <a:r>
+              <a:rPr lang="en-US" b="1" dirty="0">
+                <a:solidFill>
+                  <a:srgbClr val="FF0000"/>
+                </a:solidFill>
+              </a:rPr>
+              <a:t>Getting the reporter </a:t>
+            </a:r>
+            <a:br>
+              <a:rPr lang="en-US" b="1" dirty="0">
+                <a:solidFill>
+                  <a:srgbClr val="FF0000"/>
+                </a:solidFill>
+              </a:rPr>
+            </a:br>
+            <a:r>
+              <a:rPr lang="en-US" b="1" dirty="0">
+                <a:solidFill>
+                  <a:srgbClr val="FF0000"/>
+                </a:solidFill>
+              </a:rPr>
+              <a:t>ion intensities</a:t>
+            </a:r>
+          </a:p>
+        </p:txBody>
+      </p:sp>
+      <p:sp>
+        <p:nvSpPr>
+          <p:cNvPr id="5" name="TextBox 4">
+            <a:extLst>
+              <a:ext uri="{FF2B5EF4-FFF2-40B4-BE49-F238E27FC236}">
+                <a16:creationId xmlns:a16="http://schemas.microsoft.com/office/drawing/2014/main" id="{6FF5D90E-176E-CE4A-9B9C-75910E150B39}"/>
+              </a:ext>
+            </a:extLst>
+          </p:cNvPr>
+          <p:cNvSpPr txBox="1"/>
+          <p:nvPr/>
+        </p:nvSpPr>
+        <p:spPr>
+          <a:xfrm>
+            <a:off x="4679577" y="1352390"/>
+            <a:ext cx="2252411" cy="369332"/>
+          </a:xfrm>
+          <a:prstGeom prst="rect">
+            <a:avLst/>
+          </a:prstGeom>
+          <a:noFill/>
+        </p:spPr>
+        <p:txBody>
+          <a:bodyPr wrap="none" rtlCol="0">
+            <a:spAutoFit/>
+          </a:bodyPr>
+          <a:lstStyle/>
+          <a:p>
+            <a:r>
+              <a:rPr lang="en-US" b="1" dirty="0" err="1">
+                <a:solidFill>
+                  <a:srgbClr val="FF0000"/>
+                </a:solidFill>
+              </a:rPr>
+              <a:t>MSConvert</a:t>
+            </a:r>
+            <a:r>
+              <a:rPr lang="en-US" b="1" dirty="0">
+                <a:solidFill>
+                  <a:srgbClr val="FF0000"/>
+                </a:solidFill>
+              </a:rPr>
+              <a:t> command</a:t>
+            </a:r>
+          </a:p>
+        </p:txBody>
+      </p:sp>
+      <p:sp>
+        <p:nvSpPr>
+          <p:cNvPr id="6" name="TextBox 5">
+            <a:extLst>
+              <a:ext uri="{FF2B5EF4-FFF2-40B4-BE49-F238E27FC236}">
+                <a16:creationId xmlns:a16="http://schemas.microsoft.com/office/drawing/2014/main" id="{ADFE3E20-69B9-0649-ABF8-A46E357AFCBC}"/>
+              </a:ext>
+            </a:extLst>
+          </p:cNvPr>
+          <p:cNvSpPr txBox="1"/>
+          <p:nvPr/>
+        </p:nvSpPr>
+        <p:spPr>
+          <a:xfrm>
+            <a:off x="4894730" y="4218535"/>
+            <a:ext cx="2267224" cy="369332"/>
+          </a:xfrm>
+          <a:prstGeom prst="rect">
+            <a:avLst/>
+          </a:prstGeom>
+          <a:noFill/>
+        </p:spPr>
+        <p:txBody>
+          <a:bodyPr wrap="none" rtlCol="0">
+            <a:spAutoFit/>
+          </a:bodyPr>
+          <a:lstStyle/>
+          <a:p>
+            <a:r>
+              <a:rPr lang="en-US" b="1" dirty="0">
+                <a:solidFill>
+                  <a:srgbClr val="FF0000"/>
+                </a:solidFill>
+              </a:rPr>
+              <a:t>Number of MS2 scans</a:t>
+            </a:r>
+          </a:p>
+        </p:txBody>
+      </p:sp>
     </p:spTree>
     <p:extLst>
       <p:ext uri="{BB962C8B-B14F-4D97-AF65-F5344CB8AC3E}">
@@ -6082,6 +6323,48 @@
           </a:p>
         </p:txBody>
       </p:sp>
+      <p:cxnSp>
+        <p:nvCxnSpPr>
+          <p:cNvPr id="7" name="Straight Arrow Connector 6">
+            <a:extLst>
+              <a:ext uri="{FF2B5EF4-FFF2-40B4-BE49-F238E27FC236}">
+                <a16:creationId xmlns:a16="http://schemas.microsoft.com/office/drawing/2014/main" id="{790B0E59-90F1-AA47-BDA2-F5BFE25F9AA0}"/>
+              </a:ext>
+            </a:extLst>
+          </p:cNvPr>
+          <p:cNvCxnSpPr/>
+          <p:nvPr/>
+        </p:nvCxnSpPr>
+        <p:spPr>
+          <a:xfrm flipH="1">
+            <a:off x="6300908" y="4449055"/>
+            <a:ext cx="430305" cy="0"/>
+          </a:xfrm>
+          <a:prstGeom prst="straightConnector1">
+            <a:avLst/>
+          </a:prstGeom>
+          <a:ln w="38100">
+            <a:solidFill>
+              <a:srgbClr val="FF0000"/>
+            </a:solidFill>
+            <a:tailEnd type="triangle"/>
+          </a:ln>
+        </p:spPr>
+        <p:style>
+          <a:lnRef idx="1">
+            <a:schemeClr val="accent1"/>
+          </a:lnRef>
+          <a:fillRef idx="0">
+            <a:schemeClr val="accent1"/>
+          </a:fillRef>
+          <a:effectRef idx="0">
+            <a:schemeClr val="accent1"/>
+          </a:effectRef>
+          <a:fontRef idx="minor">
+            <a:schemeClr val="tx1"/>
+          </a:fontRef>
+        </p:style>
+      </p:cxnSp>
     </p:spTree>
     <p:extLst>
       <p:ext uri="{BB962C8B-B14F-4D97-AF65-F5344CB8AC3E}">
@@ -6142,6 +6425,45 @@
           </a:prstGeom>
         </p:spPr>
       </p:pic>
+      <p:sp>
+        <p:nvSpPr>
+          <p:cNvPr id="2" name="TextBox 1">
+            <a:extLst>
+              <a:ext uri="{FF2B5EF4-FFF2-40B4-BE49-F238E27FC236}">
+                <a16:creationId xmlns:a16="http://schemas.microsoft.com/office/drawing/2014/main" id="{5AC607B3-FA54-D64D-A79C-441F9EAF51E3}"/>
+              </a:ext>
+            </a:extLst>
+          </p:cNvPr>
+          <p:cNvSpPr txBox="1"/>
+          <p:nvPr/>
+        </p:nvSpPr>
+        <p:spPr>
+          <a:xfrm>
+            <a:off x="3926541" y="6293223"/>
+            <a:ext cx="3318601" cy="369332"/>
+          </a:xfrm>
+          <a:prstGeom prst="rect">
+            <a:avLst/>
+          </a:prstGeom>
+          <a:noFill/>
+        </p:spPr>
+        <p:txBody>
+          <a:bodyPr wrap="none" rtlCol="0">
+            <a:spAutoFit/>
+          </a:bodyPr>
+          <a:lstStyle/>
+          <a:p>
+            <a:r>
+              <a:rPr lang="en-US" b="1" dirty="0">
+                <a:solidFill>
+                  <a:srgbClr val="FF0000"/>
+                </a:solidFill>
+              </a:rPr>
+              <a:t>Prompt indicates we are finished</a:t>
+            </a:r>
+          </a:p>
+        </p:txBody>
+      </p:sp>
     </p:spTree>
     <p:extLst>
       <p:ext uri="{BB962C8B-B14F-4D97-AF65-F5344CB8AC3E}">
@@ -6202,6 +6524,342 @@
           </a:prstGeom>
         </p:spPr>
       </p:pic>
+      <p:cxnSp>
+        <p:nvCxnSpPr>
+          <p:cNvPr id="4" name="Straight Arrow Connector 3">
+            <a:extLst>
+              <a:ext uri="{FF2B5EF4-FFF2-40B4-BE49-F238E27FC236}">
+                <a16:creationId xmlns:a16="http://schemas.microsoft.com/office/drawing/2014/main" id="{61E7DEE8-9558-2945-970B-A2A0638B4814}"/>
+              </a:ext>
+            </a:extLst>
+          </p:cNvPr>
+          <p:cNvCxnSpPr/>
+          <p:nvPr/>
+        </p:nvCxnSpPr>
+        <p:spPr>
+          <a:xfrm flipH="1">
+            <a:off x="4525896" y="2551099"/>
+            <a:ext cx="399570" cy="0"/>
+          </a:xfrm>
+          <a:prstGeom prst="straightConnector1">
+            <a:avLst/>
+          </a:prstGeom>
+          <a:ln w="28575">
+            <a:solidFill>
+              <a:srgbClr val="FF0000"/>
+            </a:solidFill>
+            <a:tailEnd type="triangle"/>
+          </a:ln>
+        </p:spPr>
+        <p:style>
+          <a:lnRef idx="1">
+            <a:schemeClr val="accent1"/>
+          </a:lnRef>
+          <a:fillRef idx="0">
+            <a:schemeClr val="accent1"/>
+          </a:fillRef>
+          <a:effectRef idx="0">
+            <a:schemeClr val="accent1"/>
+          </a:effectRef>
+          <a:fontRef idx="minor">
+            <a:schemeClr val="tx1"/>
+          </a:fontRef>
+        </p:style>
+      </p:cxnSp>
+      <p:cxnSp>
+        <p:nvCxnSpPr>
+          <p:cNvPr id="5" name="Straight Arrow Connector 4">
+            <a:extLst>
+              <a:ext uri="{FF2B5EF4-FFF2-40B4-BE49-F238E27FC236}">
+                <a16:creationId xmlns:a16="http://schemas.microsoft.com/office/drawing/2014/main" id="{92CA62FB-82E8-5B4A-B6B8-ACAD55897000}"/>
+              </a:ext>
+            </a:extLst>
+          </p:cNvPr>
+          <p:cNvCxnSpPr/>
+          <p:nvPr/>
+        </p:nvCxnSpPr>
+        <p:spPr>
+          <a:xfrm flipH="1">
+            <a:off x="4525896" y="2949388"/>
+            <a:ext cx="399570" cy="0"/>
+          </a:xfrm>
+          <a:prstGeom prst="straightConnector1">
+            <a:avLst/>
+          </a:prstGeom>
+          <a:ln w="28575">
+            <a:solidFill>
+              <a:srgbClr val="FF0000"/>
+            </a:solidFill>
+            <a:tailEnd type="triangle"/>
+          </a:ln>
+        </p:spPr>
+        <p:style>
+          <a:lnRef idx="1">
+            <a:schemeClr val="accent1"/>
+          </a:lnRef>
+          <a:fillRef idx="0">
+            <a:schemeClr val="accent1"/>
+          </a:fillRef>
+          <a:effectRef idx="0">
+            <a:schemeClr val="accent1"/>
+          </a:effectRef>
+          <a:fontRef idx="minor">
+            <a:schemeClr val="tx1"/>
+          </a:fontRef>
+        </p:style>
+      </p:cxnSp>
+      <p:cxnSp>
+        <p:nvCxnSpPr>
+          <p:cNvPr id="6" name="Straight Arrow Connector 5">
+            <a:extLst>
+              <a:ext uri="{FF2B5EF4-FFF2-40B4-BE49-F238E27FC236}">
+                <a16:creationId xmlns:a16="http://schemas.microsoft.com/office/drawing/2014/main" id="{4F091E4B-F5F2-3645-8C8D-D7314A08A477}"/>
+              </a:ext>
+            </a:extLst>
+          </p:cNvPr>
+          <p:cNvCxnSpPr/>
+          <p:nvPr/>
+        </p:nvCxnSpPr>
+        <p:spPr>
+          <a:xfrm flipH="1">
+            <a:off x="4525896" y="3333590"/>
+            <a:ext cx="399570" cy="0"/>
+          </a:xfrm>
+          <a:prstGeom prst="straightConnector1">
+            <a:avLst/>
+          </a:prstGeom>
+          <a:ln w="28575">
+            <a:solidFill>
+              <a:srgbClr val="FF0000"/>
+            </a:solidFill>
+            <a:tailEnd type="triangle"/>
+          </a:ln>
+        </p:spPr>
+        <p:style>
+          <a:lnRef idx="1">
+            <a:schemeClr val="accent1"/>
+          </a:lnRef>
+          <a:fillRef idx="0">
+            <a:schemeClr val="accent1"/>
+          </a:fillRef>
+          <a:effectRef idx="0">
+            <a:schemeClr val="accent1"/>
+          </a:effectRef>
+          <a:fontRef idx="minor">
+            <a:schemeClr val="tx1"/>
+          </a:fontRef>
+        </p:style>
+      </p:cxnSp>
+      <p:cxnSp>
+        <p:nvCxnSpPr>
+          <p:cNvPr id="7" name="Straight Arrow Connector 6">
+            <a:extLst>
+              <a:ext uri="{FF2B5EF4-FFF2-40B4-BE49-F238E27FC236}">
+                <a16:creationId xmlns:a16="http://schemas.microsoft.com/office/drawing/2014/main" id="{B501C63A-A1B6-7743-A9C0-B2D0FD3F725A}"/>
+              </a:ext>
+            </a:extLst>
+          </p:cNvPr>
+          <p:cNvCxnSpPr/>
+          <p:nvPr/>
+        </p:nvCxnSpPr>
+        <p:spPr>
+          <a:xfrm flipH="1">
+            <a:off x="4525896" y="3733159"/>
+            <a:ext cx="399570" cy="0"/>
+          </a:xfrm>
+          <a:prstGeom prst="straightConnector1">
+            <a:avLst/>
+          </a:prstGeom>
+          <a:ln w="28575">
+            <a:solidFill>
+              <a:srgbClr val="FF0000"/>
+            </a:solidFill>
+            <a:tailEnd type="triangle"/>
+          </a:ln>
+        </p:spPr>
+        <p:style>
+          <a:lnRef idx="1">
+            <a:schemeClr val="accent1"/>
+          </a:lnRef>
+          <a:fillRef idx="0">
+            <a:schemeClr val="accent1"/>
+          </a:fillRef>
+          <a:effectRef idx="0">
+            <a:schemeClr val="accent1"/>
+          </a:effectRef>
+          <a:fontRef idx="minor">
+            <a:schemeClr val="tx1"/>
+          </a:fontRef>
+        </p:style>
+      </p:cxnSp>
+      <p:cxnSp>
+        <p:nvCxnSpPr>
+          <p:cNvPr id="8" name="Straight Arrow Connector 7">
+            <a:extLst>
+              <a:ext uri="{FF2B5EF4-FFF2-40B4-BE49-F238E27FC236}">
+                <a16:creationId xmlns:a16="http://schemas.microsoft.com/office/drawing/2014/main" id="{8585A82A-CC57-C446-AAF3-2FFA492F1514}"/>
+              </a:ext>
+            </a:extLst>
+          </p:cNvPr>
+          <p:cNvCxnSpPr/>
+          <p:nvPr/>
+        </p:nvCxnSpPr>
+        <p:spPr>
+          <a:xfrm flipH="1">
+            <a:off x="4525896" y="4140413"/>
+            <a:ext cx="399570" cy="0"/>
+          </a:xfrm>
+          <a:prstGeom prst="straightConnector1">
+            <a:avLst/>
+          </a:prstGeom>
+          <a:ln w="28575">
+            <a:solidFill>
+              <a:srgbClr val="FF0000"/>
+            </a:solidFill>
+            <a:tailEnd type="triangle"/>
+          </a:ln>
+        </p:spPr>
+        <p:style>
+          <a:lnRef idx="1">
+            <a:schemeClr val="accent1"/>
+          </a:lnRef>
+          <a:fillRef idx="0">
+            <a:schemeClr val="accent1"/>
+          </a:fillRef>
+          <a:effectRef idx="0">
+            <a:schemeClr val="accent1"/>
+          </a:effectRef>
+          <a:fontRef idx="minor">
+            <a:schemeClr val="tx1"/>
+          </a:fontRef>
+        </p:style>
+      </p:cxnSp>
+      <p:cxnSp>
+        <p:nvCxnSpPr>
+          <p:cNvPr id="9" name="Straight Arrow Connector 8">
+            <a:extLst>
+              <a:ext uri="{FF2B5EF4-FFF2-40B4-BE49-F238E27FC236}">
+                <a16:creationId xmlns:a16="http://schemas.microsoft.com/office/drawing/2014/main" id="{382C74B6-B186-7C44-ABB4-D6F809006464}"/>
+              </a:ext>
+            </a:extLst>
+          </p:cNvPr>
+          <p:cNvCxnSpPr/>
+          <p:nvPr/>
+        </p:nvCxnSpPr>
+        <p:spPr>
+          <a:xfrm flipH="1">
+            <a:off x="4525896" y="4538702"/>
+            <a:ext cx="399570" cy="0"/>
+          </a:xfrm>
+          <a:prstGeom prst="straightConnector1">
+            <a:avLst/>
+          </a:prstGeom>
+          <a:ln w="28575">
+            <a:solidFill>
+              <a:srgbClr val="FF0000"/>
+            </a:solidFill>
+            <a:tailEnd type="triangle"/>
+          </a:ln>
+        </p:spPr>
+        <p:style>
+          <a:lnRef idx="1">
+            <a:schemeClr val="accent1"/>
+          </a:lnRef>
+          <a:fillRef idx="0">
+            <a:schemeClr val="accent1"/>
+          </a:fillRef>
+          <a:effectRef idx="0">
+            <a:schemeClr val="accent1"/>
+          </a:effectRef>
+          <a:fontRef idx="minor">
+            <a:schemeClr val="tx1"/>
+          </a:fontRef>
+        </p:style>
+      </p:cxnSp>
+      <p:cxnSp>
+        <p:nvCxnSpPr>
+          <p:cNvPr id="10" name="Straight Arrow Connector 9">
+            <a:extLst>
+              <a:ext uri="{FF2B5EF4-FFF2-40B4-BE49-F238E27FC236}">
+                <a16:creationId xmlns:a16="http://schemas.microsoft.com/office/drawing/2014/main" id="{0939A536-9155-FC4D-967F-CB5826A4A61B}"/>
+              </a:ext>
+            </a:extLst>
+          </p:cNvPr>
+          <p:cNvCxnSpPr/>
+          <p:nvPr/>
+        </p:nvCxnSpPr>
+        <p:spPr>
+          <a:xfrm flipH="1">
+            <a:off x="4525896" y="4944675"/>
+            <a:ext cx="399570" cy="0"/>
+          </a:xfrm>
+          <a:prstGeom prst="straightConnector1">
+            <a:avLst/>
+          </a:prstGeom>
+          <a:ln w="28575">
+            <a:solidFill>
+              <a:srgbClr val="FF0000"/>
+            </a:solidFill>
+            <a:tailEnd type="triangle"/>
+          </a:ln>
+        </p:spPr>
+        <p:style>
+          <a:lnRef idx="1">
+            <a:schemeClr val="accent1"/>
+          </a:lnRef>
+          <a:fillRef idx="0">
+            <a:schemeClr val="accent1"/>
+          </a:fillRef>
+          <a:effectRef idx="0">
+            <a:schemeClr val="accent1"/>
+          </a:effectRef>
+          <a:fontRef idx="minor">
+            <a:schemeClr val="tx1"/>
+          </a:fontRef>
+        </p:style>
+      </p:cxnSp>
+      <p:cxnSp>
+        <p:nvCxnSpPr>
+          <p:cNvPr id="11" name="Straight Arrow Connector 10">
+            <a:extLst>
+              <a:ext uri="{FF2B5EF4-FFF2-40B4-BE49-F238E27FC236}">
+                <a16:creationId xmlns:a16="http://schemas.microsoft.com/office/drawing/2014/main" id="{AF1DBE37-B5F8-E749-81BE-9F57E8DA761D}"/>
+              </a:ext>
+            </a:extLst>
+          </p:cNvPr>
+          <p:cNvCxnSpPr/>
+          <p:nvPr/>
+        </p:nvCxnSpPr>
+        <p:spPr>
+          <a:xfrm flipH="1">
+            <a:off x="4525896" y="5350648"/>
+            <a:ext cx="399570" cy="0"/>
+          </a:xfrm>
+          <a:prstGeom prst="straightConnector1">
+            <a:avLst/>
+          </a:prstGeom>
+          <a:ln w="28575">
+            <a:solidFill>
+              <a:srgbClr val="FF0000"/>
+            </a:solidFill>
+            <a:tailEnd type="triangle"/>
+          </a:ln>
+        </p:spPr>
+        <p:style>
+          <a:lnRef idx="1">
+            <a:schemeClr val="accent1"/>
+          </a:lnRef>
+          <a:fillRef idx="0">
+            <a:schemeClr val="accent1"/>
+          </a:fillRef>
+          <a:effectRef idx="0">
+            <a:schemeClr val="accent1"/>
+          </a:effectRef>
+          <a:fontRef idx="minor">
+            <a:schemeClr val="tx1"/>
+          </a:fontRef>
+        </p:style>
+      </p:cxnSp>
     </p:spTree>
     <p:extLst>
       <p:ext uri="{BB962C8B-B14F-4D97-AF65-F5344CB8AC3E}">
@@ -6262,6 +6920,58 @@
           </a:prstGeom>
         </p:spPr>
       </p:pic>
+      <p:sp>
+        <p:nvSpPr>
+          <p:cNvPr id="2" name="Rounded Rectangle 1">
+            <a:extLst>
+              <a:ext uri="{FF2B5EF4-FFF2-40B4-BE49-F238E27FC236}">
+                <a16:creationId xmlns:a16="http://schemas.microsoft.com/office/drawing/2014/main" id="{83D7DCFF-C6D9-984E-996E-DBEC9751A0F5}"/>
+              </a:ext>
+            </a:extLst>
+          </p:cNvPr>
+          <p:cNvSpPr/>
+          <p:nvPr/>
+        </p:nvSpPr>
+        <p:spPr>
+          <a:xfrm>
+            <a:off x="3419395" y="2136161"/>
+            <a:ext cx="1283234" cy="353466"/>
+          </a:xfrm>
+          <a:prstGeom prst="roundRect">
+            <a:avLst/>
+          </a:prstGeom>
+          <a:noFill/>
+          <a:ln w="38100">
+            <a:solidFill>
+              <a:srgbClr val="FF0000"/>
+            </a:solidFill>
+          </a:ln>
+        </p:spPr>
+        <p:style>
+          <a:lnRef idx="2">
+            <a:schemeClr val="accent1">
+              <a:shade val="50000"/>
+            </a:schemeClr>
+          </a:lnRef>
+          <a:fillRef idx="1">
+            <a:schemeClr val="accent1"/>
+          </a:fillRef>
+          <a:effectRef idx="0">
+            <a:schemeClr val="accent1"/>
+          </a:effectRef>
+          <a:fontRef idx="minor">
+            <a:schemeClr val="lt1"/>
+          </a:fontRef>
+        </p:style>
+        <p:txBody>
+          <a:bodyPr rtlCol="0" anchor="ctr"/>
+          <a:lstStyle/>
+          <a:p>
+            <a:pPr algn="ctr"/>
+            <a:endParaRPr lang="en-US"/>
+          </a:p>
+        </p:txBody>
+      </p:sp>
     </p:spTree>
     <p:extLst>
       <p:ext uri="{BB962C8B-B14F-4D97-AF65-F5344CB8AC3E}">
@@ -6322,6 +7032,215 @@
           </a:prstGeom>
         </p:spPr>
       </p:pic>
+      <p:sp>
+        <p:nvSpPr>
+          <p:cNvPr id="2" name="TextBox 1">
+            <a:extLst>
+              <a:ext uri="{FF2B5EF4-FFF2-40B4-BE49-F238E27FC236}">
+                <a16:creationId xmlns:a16="http://schemas.microsoft.com/office/drawing/2014/main" id="{E1336540-6A8A-8F46-8A97-6711415DD716}"/>
+              </a:ext>
+            </a:extLst>
+          </p:cNvPr>
+          <p:cNvSpPr txBox="1"/>
+          <p:nvPr/>
+        </p:nvSpPr>
+        <p:spPr>
+          <a:xfrm>
+            <a:off x="5012741" y="1997849"/>
+            <a:ext cx="1385507" cy="646331"/>
+          </a:xfrm>
+          <a:prstGeom prst="rect">
+            <a:avLst/>
+          </a:prstGeom>
+          <a:noFill/>
+        </p:spPr>
+        <p:txBody>
+          <a:bodyPr wrap="none" rtlCol="0">
+            <a:spAutoFit/>
+          </a:bodyPr>
+          <a:lstStyle/>
+          <a:p>
+            <a:r>
+              <a:rPr lang="en-US" b="1" dirty="0">
+                <a:solidFill>
+                  <a:srgbClr val="FF0000"/>
+                </a:solidFill>
+              </a:rPr>
+              <a:t>Reporter ion</a:t>
+            </a:r>
+            <a:br>
+              <a:rPr lang="en-US" b="1" dirty="0">
+                <a:solidFill>
+                  <a:srgbClr val="FF0000"/>
+                </a:solidFill>
+              </a:rPr>
+            </a:br>
+            <a:r>
+              <a:rPr lang="en-US" b="1" dirty="0">
+                <a:solidFill>
+                  <a:srgbClr val="FF0000"/>
+                </a:solidFill>
+              </a:rPr>
+              <a:t>data files</a:t>
+            </a:r>
+          </a:p>
+        </p:txBody>
+      </p:sp>
+      <p:sp>
+        <p:nvSpPr>
+          <p:cNvPr id="4" name="TextBox 3">
+            <a:extLst>
+              <a:ext uri="{FF2B5EF4-FFF2-40B4-BE49-F238E27FC236}">
+                <a16:creationId xmlns:a16="http://schemas.microsoft.com/office/drawing/2014/main" id="{0991AC41-9197-EE4F-952C-FD828EF8F8EC}"/>
+              </a:ext>
+            </a:extLst>
+          </p:cNvPr>
+          <p:cNvSpPr txBox="1"/>
+          <p:nvPr/>
+        </p:nvSpPr>
+        <p:spPr>
+          <a:xfrm>
+            <a:off x="5040726" y="2873828"/>
+            <a:ext cx="1288366" cy="923330"/>
+          </a:xfrm>
+          <a:prstGeom prst="rect">
+            <a:avLst/>
+          </a:prstGeom>
+          <a:noFill/>
+        </p:spPr>
+        <p:txBody>
+          <a:bodyPr wrap="none" rtlCol="0">
+            <a:spAutoFit/>
+          </a:bodyPr>
+          <a:lstStyle/>
+          <a:p>
+            <a:r>
+              <a:rPr lang="en-US" b="1" dirty="0">
+                <a:solidFill>
+                  <a:srgbClr val="FF0000"/>
+                </a:solidFill>
+              </a:rPr>
+              <a:t>ms2 format</a:t>
+            </a:r>
+            <a:br>
+              <a:rPr lang="en-US" b="1" dirty="0">
+                <a:solidFill>
+                  <a:srgbClr val="FF0000"/>
+                </a:solidFill>
+              </a:rPr>
+            </a:br>
+            <a:r>
+              <a:rPr lang="en-US" b="1" dirty="0">
+                <a:solidFill>
+                  <a:srgbClr val="FF0000"/>
+                </a:solidFill>
+              </a:rPr>
+              <a:t>files for</a:t>
+            </a:r>
+            <a:br>
+              <a:rPr lang="en-US" b="1" dirty="0">
+                <a:solidFill>
+                  <a:srgbClr val="FF0000"/>
+                </a:solidFill>
+              </a:rPr>
+            </a:br>
+            <a:r>
+              <a:rPr lang="en-US" b="1" dirty="0">
+                <a:solidFill>
+                  <a:srgbClr val="FF0000"/>
+                </a:solidFill>
+              </a:rPr>
+              <a:t>Comet</a:t>
+            </a:r>
+          </a:p>
+        </p:txBody>
+      </p:sp>
+      <p:cxnSp>
+        <p:nvCxnSpPr>
+          <p:cNvPr id="6" name="Straight Arrow Connector 5">
+            <a:extLst>
+              <a:ext uri="{FF2B5EF4-FFF2-40B4-BE49-F238E27FC236}">
+                <a16:creationId xmlns:a16="http://schemas.microsoft.com/office/drawing/2014/main" id="{B7807089-7B1A-1042-8E91-C35340580FEE}"/>
+              </a:ext>
+            </a:extLst>
+          </p:cNvPr>
+          <p:cNvCxnSpPr/>
+          <p:nvPr/>
+        </p:nvCxnSpPr>
+        <p:spPr>
+          <a:xfrm flipH="1">
+            <a:off x="4472108" y="3327187"/>
+            <a:ext cx="514830" cy="0"/>
+          </a:xfrm>
+          <a:prstGeom prst="straightConnector1">
+            <a:avLst/>
+          </a:prstGeom>
+          <a:ln w="57150">
+            <a:solidFill>
+              <a:srgbClr val="FF0000"/>
+            </a:solidFill>
+            <a:tailEnd type="triangle"/>
+          </a:ln>
+        </p:spPr>
+        <p:style>
+          <a:lnRef idx="1">
+            <a:schemeClr val="accent1"/>
+          </a:lnRef>
+          <a:fillRef idx="0">
+            <a:schemeClr val="accent1"/>
+          </a:fillRef>
+          <a:effectRef idx="0">
+            <a:schemeClr val="accent1"/>
+          </a:effectRef>
+          <a:fontRef idx="minor">
+            <a:schemeClr val="tx1"/>
+          </a:fontRef>
+        </p:style>
+      </p:cxnSp>
+      <p:cxnSp>
+        <p:nvCxnSpPr>
+          <p:cNvPr id="8" name="Straight Arrow Connector 7">
+            <a:extLst>
+              <a:ext uri="{FF2B5EF4-FFF2-40B4-BE49-F238E27FC236}">
+                <a16:creationId xmlns:a16="http://schemas.microsoft.com/office/drawing/2014/main" id="{C1FB3917-F5AF-A54F-8192-4132FC4EB39E}"/>
+              </a:ext>
+            </a:extLst>
+          </p:cNvPr>
+          <p:cNvCxnSpPr>
+            <a:cxnSpLocks/>
+          </p:cNvCxnSpPr>
+          <p:nvPr/>
+        </p:nvCxnSpPr>
+        <p:spPr>
+          <a:xfrm flipH="1">
+            <a:off x="4833258" y="2343630"/>
+            <a:ext cx="238204" cy="0"/>
+          </a:xfrm>
+          <a:prstGeom prst="straightConnector1">
+            <a:avLst/>
+          </a:prstGeom>
+          <a:ln w="57150">
+            <a:solidFill>
+              <a:srgbClr val="FF0000"/>
+            </a:solidFill>
+            <a:tailEnd type="triangle"/>
+          </a:ln>
+        </p:spPr>
+        <p:style>
+          <a:lnRef idx="1">
+            <a:schemeClr val="accent1"/>
+          </a:lnRef>
+          <a:fillRef idx="0">
+            <a:schemeClr val="accent1"/>
+          </a:fillRef>
+          <a:effectRef idx="0">
+            <a:schemeClr val="accent1"/>
+          </a:effectRef>
+          <a:fontRef idx="minor">
+            <a:schemeClr val="tx1"/>
+          </a:fontRef>
+        </p:style>
+      </p:cxnSp>
     </p:spTree>
     <p:extLst>
       <p:ext uri="{BB962C8B-B14F-4D97-AF65-F5344CB8AC3E}">
@@ -6382,6 +7301,58 @@
           </a:prstGeom>
         </p:spPr>
       </p:pic>
+      <p:sp>
+        <p:nvSpPr>
+          <p:cNvPr id="2" name="Oval 1">
+            <a:extLst>
+              <a:ext uri="{FF2B5EF4-FFF2-40B4-BE49-F238E27FC236}">
+                <a16:creationId xmlns:a16="http://schemas.microsoft.com/office/drawing/2014/main" id="{A0E88AB6-3E48-1343-B004-87E270DE64AB}"/>
+              </a:ext>
+            </a:extLst>
+          </p:cNvPr>
+          <p:cNvSpPr/>
+          <p:nvPr/>
+        </p:nvSpPr>
+        <p:spPr>
+          <a:xfrm>
+            <a:off x="3304134" y="4395267"/>
+            <a:ext cx="5678501" cy="461042"/>
+          </a:xfrm>
+          <a:prstGeom prst="ellipse">
+            <a:avLst/>
+          </a:prstGeom>
+          <a:noFill/>
+          <a:ln w="38100">
+            <a:solidFill>
+              <a:srgbClr val="FF0000"/>
+            </a:solidFill>
+          </a:ln>
+        </p:spPr>
+        <p:style>
+          <a:lnRef idx="2">
+            <a:schemeClr val="accent1">
+              <a:shade val="50000"/>
+            </a:schemeClr>
+          </a:lnRef>
+          <a:fillRef idx="1">
+            <a:schemeClr val="accent1"/>
+          </a:fillRef>
+          <a:effectRef idx="0">
+            <a:schemeClr val="accent1"/>
+          </a:effectRef>
+          <a:fontRef idx="minor">
+            <a:schemeClr val="lt1"/>
+          </a:fontRef>
+        </p:style>
+        <p:txBody>
+          <a:bodyPr rtlCol="0" anchor="ctr"/>
+          <a:lstStyle/>
+          <a:p>
+            <a:pPr algn="ctr"/>
+            <a:endParaRPr lang="en-US"/>
+          </a:p>
+        </p:txBody>
+      </p:sp>
     </p:spTree>
     <p:extLst>
       <p:ext uri="{BB962C8B-B14F-4D97-AF65-F5344CB8AC3E}">
@@ -6442,6 +7413,58 @@
           </a:prstGeom>
         </p:spPr>
       </p:pic>
+      <p:sp>
+        <p:nvSpPr>
+          <p:cNvPr id="2" name="Oval 1">
+            <a:extLst>
+              <a:ext uri="{FF2B5EF4-FFF2-40B4-BE49-F238E27FC236}">
+                <a16:creationId xmlns:a16="http://schemas.microsoft.com/office/drawing/2014/main" id="{9AD70252-F5E1-7A47-8906-569572C95303}"/>
+              </a:ext>
+            </a:extLst>
+          </p:cNvPr>
+          <p:cNvSpPr/>
+          <p:nvPr/>
+        </p:nvSpPr>
+        <p:spPr>
+          <a:xfrm>
+            <a:off x="3480867" y="1944061"/>
+            <a:ext cx="1483019" cy="837559"/>
+          </a:xfrm>
+          <a:prstGeom prst="ellipse">
+            <a:avLst/>
+          </a:prstGeom>
+          <a:noFill/>
+          <a:ln w="38100">
+            <a:solidFill>
+              <a:srgbClr val="FF0000"/>
+            </a:solidFill>
+          </a:ln>
+        </p:spPr>
+        <p:style>
+          <a:lnRef idx="2">
+            <a:schemeClr val="accent1">
+              <a:shade val="50000"/>
+            </a:schemeClr>
+          </a:lnRef>
+          <a:fillRef idx="1">
+            <a:schemeClr val="accent1"/>
+          </a:fillRef>
+          <a:effectRef idx="0">
+            <a:schemeClr val="accent1"/>
+          </a:effectRef>
+          <a:fontRef idx="minor">
+            <a:schemeClr val="lt1"/>
+          </a:fontRef>
+        </p:style>
+        <p:txBody>
+          <a:bodyPr rtlCol="0" anchor="ctr"/>
+          <a:lstStyle/>
+          <a:p>
+            <a:pPr algn="ctr"/>
+            <a:endParaRPr lang="en-US"/>
+          </a:p>
+        </p:txBody>
+      </p:sp>
     </p:spTree>
     <p:extLst>
       <p:ext uri="{BB962C8B-B14F-4D97-AF65-F5344CB8AC3E}">
@@ -6502,6 +7525,45 @@
           </a:prstGeom>
         </p:spPr>
       </p:pic>
+      <p:sp>
+        <p:nvSpPr>
+          <p:cNvPr id="2" name="TextBox 1">
+            <a:extLst>
+              <a:ext uri="{FF2B5EF4-FFF2-40B4-BE49-F238E27FC236}">
+                <a16:creationId xmlns:a16="http://schemas.microsoft.com/office/drawing/2014/main" id="{1D6683B0-5DC3-9641-86CF-F5926FF1CB8C}"/>
+              </a:ext>
+            </a:extLst>
+          </p:cNvPr>
+          <p:cNvSpPr txBox="1"/>
+          <p:nvPr/>
+        </p:nvSpPr>
+        <p:spPr>
+          <a:xfrm>
+            <a:off x="4979254" y="3059668"/>
+            <a:ext cx="864339" cy="369332"/>
+          </a:xfrm>
+          <a:prstGeom prst="rect">
+            <a:avLst/>
+          </a:prstGeom>
+          <a:noFill/>
+        </p:spPr>
+        <p:txBody>
+          <a:bodyPr wrap="none" rtlCol="0">
+            <a:spAutoFit/>
+          </a:bodyPr>
+          <a:lstStyle/>
+          <a:p>
+            <a:r>
+              <a:rPr lang="en-US" b="1" dirty="0">
+                <a:solidFill>
+                  <a:srgbClr val="FF0000"/>
+                </a:solidFill>
+              </a:rPr>
+              <a:t>24 files</a:t>
+            </a:r>
+          </a:p>
+        </p:txBody>
+      </p:sp>
     </p:spTree>
     <p:extLst>
       <p:ext uri="{BB962C8B-B14F-4D97-AF65-F5344CB8AC3E}">
@@ -6674,6 +7736,58 @@
           </a:prstGeom>
         </p:spPr>
       </p:pic>
+      <p:sp>
+        <p:nvSpPr>
+          <p:cNvPr id="2" name="Rounded Rectangle 1">
+            <a:extLst>
+              <a:ext uri="{FF2B5EF4-FFF2-40B4-BE49-F238E27FC236}">
+                <a16:creationId xmlns:a16="http://schemas.microsoft.com/office/drawing/2014/main" id="{2ED1C170-68FF-2541-BD1B-040F352BFE0F}"/>
+              </a:ext>
+            </a:extLst>
+          </p:cNvPr>
+          <p:cNvSpPr/>
+          <p:nvPr/>
+        </p:nvSpPr>
+        <p:spPr>
+          <a:xfrm>
+            <a:off x="2904565" y="1221761"/>
+            <a:ext cx="1037344" cy="468726"/>
+          </a:xfrm>
+          <a:prstGeom prst="roundRect">
+            <a:avLst/>
+          </a:prstGeom>
+          <a:noFill/>
+          <a:ln w="38100">
+            <a:solidFill>
+              <a:srgbClr val="FF0000"/>
+            </a:solidFill>
+          </a:ln>
+        </p:spPr>
+        <p:style>
+          <a:lnRef idx="2">
+            <a:schemeClr val="accent1">
+              <a:shade val="50000"/>
+            </a:schemeClr>
+          </a:lnRef>
+          <a:fillRef idx="1">
+            <a:schemeClr val="accent1"/>
+          </a:fillRef>
+          <a:effectRef idx="0">
+            <a:schemeClr val="accent1"/>
+          </a:effectRef>
+          <a:fontRef idx="minor">
+            <a:schemeClr val="lt1"/>
+          </a:fontRef>
+        </p:style>
+        <p:txBody>
+          <a:bodyPr rtlCol="0" anchor="ctr"/>
+          <a:lstStyle/>
+          <a:p>
+            <a:pPr algn="ctr"/>
+            <a:endParaRPr lang="en-US"/>
+          </a:p>
+        </p:txBody>
+      </p:sp>
     </p:spTree>
     <p:extLst>
       <p:ext uri="{BB962C8B-B14F-4D97-AF65-F5344CB8AC3E}">

</xml_diff>